<commit_message>
added fog icon; updated presentations & code.
</commit_message>
<xml_diff>
--- a/weatherEye.pptx
+++ b/weatherEye.pptx
@@ -15,6 +15,7 @@
     <p:sldId id="260" r:id="rId12"/>
     <p:sldId id="261" r:id="rId13"/>
     <p:sldId id="262" r:id="rId14"/>
+    <p:sldId id="263" r:id="rId15"/>
   </p:sldIdLst>
   <p:sldSz cx="24384000" cy="13716000"/>
   <p:notesSz cx="6858000" cy="9144000"/>
@@ -3091,21 +3092,15 @@
         </p:spPr>
         <p:txBody>
           <a:bodyPr/>
-          <a:lstStyle/>
-          <a:p>
-            <a:pPr defTabSz="528319">
-              <a:defRPr sz="7168"/>
-            </a:pPr>
-            <a:r>
-              <a:t>When It Rains </a:t>
-            </a:r>
-          </a:p>
-          <a:p>
-            <a:pPr defTabSz="528319">
-              <a:defRPr sz="7168"/>
-            </a:pPr>
-            <a:r>
-              <a:t>and your windows are down…</a:t>
+          <a:lstStyle>
+            <a:lvl1pPr defTabSz="784225">
+              <a:defRPr sz="10640"/>
+            </a:lvl1pPr>
+          </a:lstStyle>
+          <a:p>
+            <a:pPr/>
+            <a:r>
+              <a:t>What Can Your Car Know For You?</a:t>
             </a:r>
           </a:p>
         </p:txBody>
@@ -3131,7 +3126,7 @@
               <a:defRPr sz="6400"/>
             </a:pPr>
             <a:r>
-              <a:t>You get wet</a:t>
+              <a:t>Lots of data from sensors…</a:t>
             </a:r>
           </a:p>
           <a:p>
@@ -3139,7 +3134,7 @@
               <a:defRPr sz="6400"/>
             </a:pPr>
             <a:r>
-              <a:t>Your passengers get wet</a:t>
+              <a:t>Internet access…</a:t>
             </a:r>
           </a:p>
           <a:p>
@@ -3147,7 +3142,7 @@
               <a:defRPr sz="6400"/>
             </a:pPr>
             <a:r>
-              <a:t>Your stuff gets wet</a:t>
+              <a:t>Synthesize, decide and notify</a:t>
             </a:r>
           </a:p>
         </p:txBody>
@@ -3404,19 +3399,7 @@
               <a:defRPr sz="7168"/>
             </a:pPr>
             <a:r>
-              <a:t>If only your car could </a:t>
-            </a:r>
-            <a:r>
-              <a:rPr b="1">
-                <a:latin typeface="Helvetica"/>
-                <a:ea typeface="Helvetica"/>
-                <a:cs typeface="Helvetica"/>
-                <a:sym typeface="Helvetica"/>
-              </a:rPr>
-              <a:t>tell</a:t>
-            </a:r>
-            <a:r>
-              <a:t> </a:t>
+              <a:t>When It Rains </a:t>
             </a:r>
           </a:p>
           <a:p>
@@ -3424,7 +3407,7 @@
               <a:defRPr sz="7168"/>
             </a:pPr>
             <a:r>
-              <a:t>you when it’s going to rain…</a:t>
+              <a:t>and your windows are down…</a:t>
             </a:r>
           </a:p>
         </p:txBody>
@@ -3450,7 +3433,7 @@
               <a:defRPr sz="6400"/>
             </a:pPr>
             <a:r>
-              <a:t>You could roll up your windows</a:t>
+              <a:t>You get wet</a:t>
             </a:r>
           </a:p>
           <a:p>
@@ -3458,7 +3441,7 @@
               <a:defRPr sz="6400"/>
             </a:pPr>
             <a:r>
-              <a:t>Your passengers would stay dry</a:t>
+              <a:t>Your passengers get wet</a:t>
             </a:r>
           </a:p>
           <a:p>
@@ -3466,7 +3449,7 @@
               <a:defRPr sz="6400"/>
             </a:pPr>
             <a:r>
-              <a:t>Your stuff stays dry</a:t>
+              <a:t>Your stuff gets wet</a:t>
             </a:r>
           </a:p>
         </p:txBody>
@@ -3702,141 +3685,90 @@
           <a:chExt cx="0" cy="0"/>
         </a:xfrm>
       </p:grpSpPr>
-      <p:pic>
-        <p:nvPicPr>
-          <p:cNvPr id="128" name="pasted-image.png"/>
-          <p:cNvPicPr>
-            <a:picLocks noChangeAspect="1"/>
-          </p:cNvPicPr>
-          <p:nvPr/>
-        </p:nvPicPr>
-        <p:blipFill>
-          <a:blip r:embed="rId2">
-            <a:extLst/>
-          </a:blip>
-          <a:stretch>
-            <a:fillRect/>
-          </a:stretch>
-        </p:blipFill>
+      <p:sp>
+        <p:nvSpPr>
+          <p:cNvPr id="128" name="Shape 128"/>
+          <p:cNvSpPr/>
+          <p:nvPr>
+            <p:ph type="title"/>
+          </p:nvPr>
+        </p:nvSpPr>
         <p:spPr>
-          <a:xfrm>
-            <a:off x="4159501" y="1596714"/>
-            <a:ext cx="16064998" cy="10522572"/>
-          </a:xfrm>
           <a:prstGeom prst="rect">
             <a:avLst/>
           </a:prstGeom>
-          <a:ln w="12700">
-            <a:miter lim="400000"/>
-          </a:ln>
         </p:spPr>
-      </p:pic>
+        <p:txBody>
+          <a:bodyPr/>
+          <a:lstStyle/>
+          <a:p>
+            <a:pPr defTabSz="528319">
+              <a:defRPr sz="7168"/>
+            </a:pPr>
+            <a:r>
+              <a:t>If only your car could </a:t>
+            </a:r>
+            <a:r>
+              <a:rPr b="1">
+                <a:latin typeface="Helvetica"/>
+                <a:ea typeface="Helvetica"/>
+                <a:cs typeface="Helvetica"/>
+                <a:sym typeface="Helvetica"/>
+              </a:rPr>
+              <a:t>tell</a:t>
+            </a:r>
+            <a:r>
+              <a:t> </a:t>
+            </a:r>
+          </a:p>
+          <a:p>
+            <a:pPr defTabSz="528319">
+              <a:defRPr sz="7168"/>
+            </a:pPr>
+            <a:r>
+              <a:t>you when it’s going to rain…</a:t>
+            </a:r>
+          </a:p>
+        </p:txBody>
+      </p:sp>
       <p:sp>
         <p:nvSpPr>
           <p:cNvPr id="129" name="Shape 129"/>
           <p:cNvSpPr/>
-          <p:nvPr/>
+          <p:nvPr>
+            <p:ph type="body" idx="1"/>
+          </p:nvPr>
         </p:nvSpPr>
         <p:spPr>
-          <a:xfrm>
-            <a:off x="4296767" y="4464050"/>
-            <a:ext cx="2231034" cy="1936751"/>
-          </a:xfrm>
-          <a:prstGeom prst="rightArrow">
-            <a:avLst>
-              <a:gd name="adj1" fmla="val 32000"/>
-              <a:gd name="adj2" fmla="val 41967"/>
-            </a:avLst>
+          <a:prstGeom prst="rect">
+            <a:avLst/>
           </a:prstGeom>
-          <a:blipFill>
-            <a:blip r:embed="rId3"/>
-          </a:blipFill>
-          <a:ln w="12700">
-            <a:miter lim="400000"/>
-          </a:ln>
-          <a:effectLst>
-            <a:outerShdw sx="100000" sy="100000" kx="0" ky="0" algn="b" rotWithShape="0" blurRad="38100" dist="25400" dir="5400000">
-              <a:srgbClr val="000000">
-                <a:alpha val="50000"/>
-              </a:srgbClr>
-            </a:outerShdw>
-          </a:effectLst>
-          <a:extLst>
-            <a:ext uri="{C572A759-6A51-4108-AA02-DFA0A04FC94B}">
-              <ma14:wrappingTextBoxFlag xmlns:ma14="http://schemas.microsoft.com/office/mac/drawingml/2011/main" val="1"/>
-            </a:ext>
-          </a:extLst>
         </p:spPr>
         <p:txBody>
-          <a:bodyPr lIns="50800" tIns="50800" rIns="50800" bIns="50800" anchor="ctr"/>
-          <a:lstStyle>
-            <a:lvl1pPr>
-              <a:defRPr sz="3200">
-                <a:solidFill>
-                  <a:srgbClr val="FFFFFF"/>
-                </a:solidFill>
-              </a:defRPr>
-            </a:lvl1pPr>
-          </a:lstStyle>
-          <a:p>
-            <a:pPr/>
-            <a:r>
-              <a:t>You</a:t>
-            </a:r>
-          </a:p>
-        </p:txBody>
-      </p:sp>
-      <p:sp>
-        <p:nvSpPr>
-          <p:cNvPr id="130" name="Shape 130"/>
-          <p:cNvSpPr/>
-          <p:nvPr/>
-        </p:nvSpPr>
-        <p:spPr>
-          <a:xfrm>
-            <a:off x="8718698" y="5889624"/>
-            <a:ext cx="5086202" cy="1936751"/>
-          </a:xfrm>
-          <a:prstGeom prst="rightArrow">
-            <a:avLst>
-              <a:gd name="adj1" fmla="val 32000"/>
-              <a:gd name="adj2" fmla="val 41967"/>
-            </a:avLst>
-          </a:prstGeom>
-          <a:blipFill>
-            <a:blip r:embed="rId3"/>
-          </a:blipFill>
-          <a:ln w="12700">
-            <a:miter lim="400000"/>
-          </a:ln>
-          <a:effectLst>
-            <a:outerShdw sx="100000" sy="100000" kx="0" ky="0" algn="b" rotWithShape="0" blurRad="38100" dist="25400" dir="5400000">
-              <a:srgbClr val="000000">
-                <a:alpha val="50000"/>
-              </a:srgbClr>
-            </a:outerShdw>
-          </a:effectLst>
-          <a:extLst>
-            <a:ext uri="{C572A759-6A51-4108-AA02-DFA0A04FC94B}">
-              <ma14:wrappingTextBoxFlag xmlns:ma14="http://schemas.microsoft.com/office/mac/drawingml/2011/main" val="1"/>
-            </a:ext>
-          </a:extLst>
-        </p:spPr>
-        <p:txBody>
-          <a:bodyPr lIns="50800" tIns="50800" rIns="50800" bIns="50800" anchor="ctr"/>
-          <a:lstStyle>
-            <a:lvl1pPr>
-              <a:defRPr sz="3200">
-                <a:solidFill>
-                  <a:srgbClr val="FFFFFF"/>
-                </a:solidFill>
-              </a:defRPr>
-            </a:lvl1pPr>
-          </a:lstStyle>
-          <a:p>
-            <a:pPr/>
-            <a:r>
-              <a:t>Where you’re headed</a:t>
+          <a:bodyPr/>
+          <a:lstStyle/>
+          <a:p>
+            <a:pPr>
+              <a:defRPr sz="6400"/>
+            </a:pPr>
+            <a:r>
+              <a:t>You could roll up your windows</a:t>
+            </a:r>
+          </a:p>
+          <a:p>
+            <a:pPr>
+              <a:defRPr sz="6400"/>
+            </a:pPr>
+            <a:r>
+              <a:t>Your passengers would stay dry</a:t>
+            </a:r>
+          </a:p>
+          <a:p>
+            <a:pPr>
+              <a:defRPr sz="6400"/>
+            </a:pPr>
+            <a:r>
+              <a:t>Your stuff stays dry</a:t>
             </a:r>
           </a:p>
         </p:txBody>
@@ -3880,229 +3812,7 @@
                                       <p:cBhvr>
                                         <p:cTn id="6" fill="hold"/>
                                         <p:tgtEl>
-                                          <p:spTgt spid="129"/>
-                                        </p:tgtEl>
-                                        <p:attrNameLst>
-                                          <p:attrName>style.visibility</p:attrName>
-                                        </p:attrNameLst>
-                                      </p:cBhvr>
-                                      <p:to>
-                                        <p:strVal val="visible"/>
-                                      </p:to>
-                                    </p:set>
-                                  </p:childTnLst>
-                                </p:cTn>
-                              </p:par>
-                            </p:childTnLst>
-                          </p:cTn>
-                        </p:par>
-                      </p:childTnLst>
-                    </p:cTn>
-                  </p:par>
-                  <p:par>
-                    <p:cTn id="7" fill="hold">
-                      <p:stCondLst>
-                        <p:cond delay="indefinite"/>
-                      </p:stCondLst>
-                      <p:childTnLst>
-                        <p:par>
-                          <p:cTn id="8" fill="hold">
-                            <p:stCondLst>
-                              <p:cond delay="0"/>
-                            </p:stCondLst>
-                            <p:childTnLst>
-                              <p:par>
-                                <p:cTn id="9" presetClass="entr" nodeType="clickEffect" presetSubtype="0" presetID="1" grpId="2" fill="hold">
-                                  <p:stCondLst>
-                                    <p:cond delay="0"/>
-                                  </p:stCondLst>
-                                  <p:iterate type="el" backwards="0">
-                                    <p:tmAbs val="0"/>
-                                  </p:iterate>
-                                  <p:childTnLst>
-                                    <p:set>
-                                      <p:cBhvr>
-                                        <p:cTn id="10" fill="hold"/>
-                                        <p:tgtEl>
-                                          <p:spTgt spid="130"/>
-                                        </p:tgtEl>
-                                        <p:attrNameLst>
-                                          <p:attrName>style.visibility</p:attrName>
-                                        </p:attrNameLst>
-                                      </p:cBhvr>
-                                      <p:to>
-                                        <p:strVal val="visible"/>
-                                      </p:to>
-                                    </p:set>
-                                  </p:childTnLst>
-                                </p:cTn>
-                              </p:par>
-                            </p:childTnLst>
-                          </p:cTn>
-                        </p:par>
-                      </p:childTnLst>
-                    </p:cTn>
-                  </p:par>
-                </p:childTnLst>
-              </p:cTn>
-              <p:prevCondLst>
-                <p:cond evt="onPrev">
-                  <p:tgtEl>
-                    <p:sldTgt/>
-                  </p:tgtEl>
-                </p:cond>
-              </p:prevCondLst>
-              <p:nextCondLst>
-                <p:cond evt="onNext">
-                  <p:tgtEl>
-                    <p:sldTgt/>
-                  </p:tgtEl>
-                </p:cond>
-              </p:nextCondLst>
-            </p:seq>
-          </p:childTnLst>
-        </p:cTn>
-      </p:par>
-    </p:tnLst>
-    <p:bldLst>
-      <p:bldP build="whole" bldLvl="1" animBg="1" rev="0" advAuto="0" spid="130" grpId="2"/>
-      <p:bldP build="whole" bldLvl="1" animBg="1" rev="0" advAuto="0" spid="129" grpId="1"/>
-    </p:bldLst>
-  </p:timing>
-</p:sld>
-</file>
-
-<file path=ppt/slides/slide5.xml><?xml version="1.0" encoding="utf-8"?>
-<p:sld xmlns:a="http://schemas.openxmlformats.org/drawingml/2006/main" xmlns:r="http://schemas.openxmlformats.org/officeDocument/2006/relationships" xmlns:p="http://schemas.openxmlformats.org/presentationml/2006/main" showMasterSp="1" showMasterPhAnim="1">
-  <p:cSld>
-    <p:spTree>
-      <p:nvGrpSpPr>
-        <p:cNvPr id="1" name=""/>
-        <p:cNvGrpSpPr/>
-        <p:nvPr/>
-      </p:nvGrpSpPr>
-      <p:grpSpPr>
-        <a:xfrm>
-          <a:off x="0" y="0"/>
-          <a:ext cx="0" cy="0"/>
-          <a:chOff x="0" y="0"/>
-          <a:chExt cx="0" cy="0"/>
-        </a:xfrm>
-      </p:grpSpPr>
-      <p:sp>
-        <p:nvSpPr>
-          <p:cNvPr id="132" name="Shape 132"/>
-          <p:cNvSpPr/>
-          <p:nvPr>
-            <p:ph type="title"/>
-          </p:nvPr>
-        </p:nvSpPr>
-        <p:spPr>
-          <a:prstGeom prst="rect">
-            <a:avLst/>
-          </a:prstGeom>
-        </p:spPr>
-        <p:txBody>
-          <a:bodyPr/>
-          <a:lstStyle/>
-          <a:p>
-            <a:pPr/>
-            <a:r>
-              <a:t>Weather Eye</a:t>
-            </a:r>
-          </a:p>
-        </p:txBody>
-      </p:sp>
-      <p:sp>
-        <p:nvSpPr>
-          <p:cNvPr id="133" name="Shape 133"/>
-          <p:cNvSpPr/>
-          <p:nvPr>
-            <p:ph type="body" idx="1"/>
-          </p:nvPr>
-        </p:nvSpPr>
-        <p:spPr>
-          <a:prstGeom prst="rect">
-            <a:avLst/>
-          </a:prstGeom>
-        </p:spPr>
-        <p:txBody>
-          <a:bodyPr/>
-          <a:lstStyle/>
-          <a:p>
-            <a:pPr>
-              <a:defRPr sz="6400"/>
-            </a:pPr>
-            <a:r>
-              <a:t>Tracks the vehicle location, speed and heading</a:t>
-            </a:r>
-          </a:p>
-          <a:p>
-            <a:pPr>
-              <a:defRPr sz="6400"/>
-            </a:pPr>
-            <a:r>
-              <a:t>Predicts where you’ll be in 10 miles</a:t>
-            </a:r>
-          </a:p>
-          <a:p>
-            <a:pPr>
-              <a:defRPr sz="6400"/>
-            </a:pPr>
-            <a:r>
-              <a:t>Gets current weather at that location</a:t>
-            </a:r>
-          </a:p>
-          <a:p>
-            <a:pPr>
-              <a:defRPr sz="6400"/>
-            </a:pPr>
-            <a:r>
-              <a:t>Tells you to roll the windows up…</a:t>
-            </a:r>
-          </a:p>
-        </p:txBody>
-      </p:sp>
-    </p:spTree>
-  </p:cSld>
-  <p:clrMapOvr>
-    <a:masterClrMapping/>
-  </p:clrMapOvr>
-  <p:transition xmlns:p14="http://schemas.microsoft.com/office/powerpoint/2010/main" spd="med" advClick="1"/>
-  <p:timing>
-    <p:tnLst>
-      <p:par>
-        <p:cTn id="1" nodeType="tmRoot" restart="never" dur="indefinite" fill="hold">
-          <p:childTnLst>
-            <p:seq concurrent="1" prevAc="none" nextAc="seek">
-              <p:cTn id="2" nodeType="mainSeq" dur="indefinite" fill="hold">
-                <p:childTnLst>
-                  <p:par>
-                    <p:cTn id="3" fill="hold">
-                      <p:stCondLst>
-                        <p:cond delay="indefinite"/>
-                      </p:stCondLst>
-                      <p:childTnLst>
-                        <p:par>
-                          <p:cTn id="4" fill="hold">
-                            <p:stCondLst>
-                              <p:cond delay="0"/>
-                            </p:stCondLst>
-                            <p:childTnLst>
-                              <p:par>
-                                <p:cTn id="5" presetClass="entr" nodeType="clickEffect" presetSubtype="0" presetID="1" grpId="1" fill="hold">
-                                  <p:stCondLst>
-                                    <p:cond delay="0"/>
-                                  </p:stCondLst>
-                                  <p:iterate type="el" backwards="0">
-                                    <p:tmAbs val="0"/>
-                                  </p:iterate>
-                                  <p:childTnLst>
-                                    <p:set>
-                                      <p:cBhvr>
-                                        <p:cTn id="6" fill="hold"/>
-                                        <p:tgtEl>
-                                          <p:spTgt spid="133">
+                                          <p:spTgt spid="129">
                                             <p:bg/>
                                           </p:spTgt>
                                         </p:tgtEl>
@@ -4130,7 +3840,7 @@
                                       <p:cBhvr>
                                         <p:cTn id="8" fill="hold"/>
                                         <p:tgtEl>
-                                          <p:spTgt spid="133">
+                                          <p:spTgt spid="129">
                                             <p:txEl>
                                               <p:pRg st="0" end="0"/>
                                             </p:txEl>
@@ -4178,7 +3888,7 @@
                                       <p:cBhvr>
                                         <p:cTn id="12" fill="hold"/>
                                         <p:tgtEl>
-                                          <p:spTgt spid="133">
+                                          <p:spTgt spid="129">
                                             <p:txEl>
                                               <p:pRg st="1" end="1"/>
                                             </p:txEl>
@@ -4226,7 +3936,639 @@
                                       <p:cBhvr>
                                         <p:cTn id="16" fill="hold"/>
                                         <p:tgtEl>
-                                          <p:spTgt spid="133">
+                                          <p:spTgt spid="129">
+                                            <p:txEl>
+                                              <p:pRg st="2" end="2"/>
+                                            </p:txEl>
+                                          </p:spTgt>
+                                        </p:tgtEl>
+                                        <p:attrNameLst>
+                                          <p:attrName>style.visibility</p:attrName>
+                                        </p:attrNameLst>
+                                      </p:cBhvr>
+                                      <p:to>
+                                        <p:strVal val="visible"/>
+                                      </p:to>
+                                    </p:set>
+                                  </p:childTnLst>
+                                </p:cTn>
+                              </p:par>
+                            </p:childTnLst>
+                          </p:cTn>
+                        </p:par>
+                      </p:childTnLst>
+                    </p:cTn>
+                  </p:par>
+                </p:childTnLst>
+              </p:cTn>
+              <p:prevCondLst>
+                <p:cond evt="onPrev">
+                  <p:tgtEl>
+                    <p:sldTgt/>
+                  </p:tgtEl>
+                </p:cond>
+              </p:prevCondLst>
+              <p:nextCondLst>
+                <p:cond evt="onNext">
+                  <p:tgtEl>
+                    <p:sldTgt/>
+                  </p:tgtEl>
+                </p:cond>
+              </p:nextCondLst>
+            </p:seq>
+          </p:childTnLst>
+        </p:cTn>
+      </p:par>
+    </p:tnLst>
+    <p:bldLst>
+      <p:bldP build="p" bldLvl="5" animBg="1" rev="0" advAuto="0" spid="129" grpId="1"/>
+    </p:bldLst>
+  </p:timing>
+</p:sld>
+</file>
+
+<file path=ppt/slides/slide5.xml><?xml version="1.0" encoding="utf-8"?>
+<p:sld xmlns:a="http://schemas.openxmlformats.org/drawingml/2006/main" xmlns:r="http://schemas.openxmlformats.org/officeDocument/2006/relationships" xmlns:p="http://schemas.openxmlformats.org/presentationml/2006/main" showMasterSp="1" showMasterPhAnim="1">
+  <p:cSld>
+    <p:spTree>
+      <p:nvGrpSpPr>
+        <p:cNvPr id="1" name=""/>
+        <p:cNvGrpSpPr/>
+        <p:nvPr/>
+      </p:nvGrpSpPr>
+      <p:grpSpPr>
+        <a:xfrm>
+          <a:off x="0" y="0"/>
+          <a:ext cx="0" cy="0"/>
+          <a:chOff x="0" y="0"/>
+          <a:chExt cx="0" cy="0"/>
+        </a:xfrm>
+      </p:grpSpPr>
+      <p:pic>
+        <p:nvPicPr>
+          <p:cNvPr id="131" name="pasted-image.png"/>
+          <p:cNvPicPr>
+            <a:picLocks noChangeAspect="1"/>
+          </p:cNvPicPr>
+          <p:nvPr/>
+        </p:nvPicPr>
+        <p:blipFill>
+          <a:blip r:embed="rId2">
+            <a:extLst/>
+          </a:blip>
+          <a:stretch>
+            <a:fillRect/>
+          </a:stretch>
+        </p:blipFill>
+        <p:spPr>
+          <a:xfrm>
+            <a:off x="2032493" y="203523"/>
+            <a:ext cx="20319014" cy="13308954"/>
+          </a:xfrm>
+          <a:prstGeom prst="rect">
+            <a:avLst/>
+          </a:prstGeom>
+          <a:ln w="12700">
+            <a:miter lim="400000"/>
+          </a:ln>
+        </p:spPr>
+      </p:pic>
+      <p:sp>
+        <p:nvSpPr>
+          <p:cNvPr id="132" name="Shape 132"/>
+          <p:cNvSpPr/>
+          <p:nvPr/>
+        </p:nvSpPr>
+        <p:spPr>
+          <a:xfrm>
+            <a:off x="795866" y="3786716"/>
+            <a:ext cx="4072468" cy="1936751"/>
+          </a:xfrm>
+          <a:prstGeom prst="rightArrow">
+            <a:avLst>
+              <a:gd name="adj1" fmla="val 32000"/>
+              <a:gd name="adj2" fmla="val 41967"/>
+            </a:avLst>
+          </a:prstGeom>
+          <a:blipFill>
+            <a:blip r:embed="rId3"/>
+          </a:blipFill>
+          <a:ln w="12700">
+            <a:miter lim="400000"/>
+          </a:ln>
+          <a:effectLst>
+            <a:outerShdw sx="100000" sy="100000" kx="0" ky="0" algn="b" rotWithShape="0" blurRad="38100" dist="25400" dir="5400000">
+              <a:srgbClr val="000000">
+                <a:alpha val="50000"/>
+              </a:srgbClr>
+            </a:outerShdw>
+          </a:effectLst>
+          <a:extLst>
+            <a:ext uri="{C572A759-6A51-4108-AA02-DFA0A04FC94B}">
+              <ma14:wrappingTextBoxFlag xmlns:ma14="http://schemas.microsoft.com/office/mac/drawingml/2011/main" val="1"/>
+            </a:ext>
+          </a:extLst>
+        </p:spPr>
+        <p:txBody>
+          <a:bodyPr lIns="50800" tIns="50800" rIns="50800" bIns="50800" anchor="ctr"/>
+          <a:lstStyle>
+            <a:lvl1pPr>
+              <a:defRPr sz="3200">
+                <a:solidFill>
+                  <a:srgbClr val="FFFFFF"/>
+                </a:solidFill>
+              </a:defRPr>
+            </a:lvl1pPr>
+          </a:lstStyle>
+          <a:p>
+            <a:pPr/>
+            <a:r>
+              <a:t>Your progress</a:t>
+            </a:r>
+          </a:p>
+        </p:txBody>
+      </p:sp>
+      <p:sp>
+        <p:nvSpPr>
+          <p:cNvPr id="133" name="Shape 133"/>
+          <p:cNvSpPr/>
+          <p:nvPr/>
+        </p:nvSpPr>
+        <p:spPr>
+          <a:xfrm>
+            <a:off x="18901833" y="5059891"/>
+            <a:ext cx="5591788" cy="1936751"/>
+          </a:xfrm>
+          <a:custGeom>
+            <a:avLst/>
+            <a:gdLst/>
+            <a:ahLst/>
+            <a:cxnLst>
+              <a:cxn ang="0">
+                <a:pos x="wd2" y="hd2"/>
+              </a:cxn>
+              <a:cxn ang="5400000">
+                <a:pos x="wd2" y="hd2"/>
+              </a:cxn>
+              <a:cxn ang="10800000">
+                <a:pos x="wd2" y="hd2"/>
+              </a:cxn>
+              <a:cxn ang="16200000">
+                <a:pos x="wd2" y="hd2"/>
+              </a:cxn>
+            </a:cxnLst>
+            <a:rect l="0" t="0" r="r" b="b"/>
+            <a:pathLst>
+              <a:path w="21600" h="21600" fill="norm" stroke="1" extrusionOk="0">
+                <a:moveTo>
+                  <a:pt x="3140" y="14256"/>
+                </a:moveTo>
+                <a:lnTo>
+                  <a:pt x="3140" y="21600"/>
+                </a:lnTo>
+                <a:lnTo>
+                  <a:pt x="0" y="10800"/>
+                </a:lnTo>
+                <a:lnTo>
+                  <a:pt x="3140" y="0"/>
+                </a:lnTo>
+                <a:lnTo>
+                  <a:pt x="3140" y="7344"/>
+                </a:lnTo>
+                <a:lnTo>
+                  <a:pt x="21600" y="7344"/>
+                </a:lnTo>
+                <a:lnTo>
+                  <a:pt x="21600" y="14256"/>
+                </a:lnTo>
+                <a:close/>
+              </a:path>
+            </a:pathLst>
+          </a:custGeom>
+          <a:blipFill>
+            <a:blip r:embed="rId3"/>
+          </a:blipFill>
+          <a:ln w="12700">
+            <a:miter lim="400000"/>
+          </a:ln>
+          <a:effectLst>
+            <a:outerShdw sx="100000" sy="100000" kx="0" ky="0" algn="b" rotWithShape="0" blurRad="38100" dist="25400" dir="5400000">
+              <a:srgbClr val="000000">
+                <a:alpha val="50000"/>
+              </a:srgbClr>
+            </a:outerShdw>
+          </a:effectLst>
+          <a:extLst>
+            <a:ext uri="{C572A759-6A51-4108-AA02-DFA0A04FC94B}">
+              <ma14:wrappingTextBoxFlag xmlns:ma14="http://schemas.microsoft.com/office/mac/drawingml/2011/main" val="1"/>
+            </a:ext>
+          </a:extLst>
+        </p:spPr>
+        <p:txBody>
+          <a:bodyPr lIns="50800" tIns="50800" rIns="50800" bIns="50800" anchor="ctr"/>
+          <a:lstStyle>
+            <a:lvl1pPr>
+              <a:defRPr sz="3200">
+                <a:solidFill>
+                  <a:srgbClr val="FFFFFF"/>
+                </a:solidFill>
+              </a:defRPr>
+            </a:lvl1pPr>
+          </a:lstStyle>
+          <a:p>
+            <a:pPr/>
+            <a:r>
+              <a:t>Where you’re headed</a:t>
+            </a:r>
+          </a:p>
+        </p:txBody>
+      </p:sp>
+    </p:spTree>
+  </p:cSld>
+  <p:clrMapOvr>
+    <a:masterClrMapping/>
+  </p:clrMapOvr>
+  <p:transition xmlns:p14="http://schemas.microsoft.com/office/powerpoint/2010/main" spd="med" advClick="1"/>
+  <p:timing>
+    <p:tnLst>
+      <p:par>
+        <p:cTn id="1" nodeType="tmRoot" restart="never" dur="indefinite" fill="hold">
+          <p:childTnLst>
+            <p:seq concurrent="1" prevAc="none" nextAc="seek">
+              <p:cTn id="2" nodeType="mainSeq" dur="indefinite" fill="hold">
+                <p:childTnLst>
+                  <p:par>
+                    <p:cTn id="3" fill="hold">
+                      <p:stCondLst>
+                        <p:cond delay="indefinite"/>
+                      </p:stCondLst>
+                      <p:childTnLst>
+                        <p:par>
+                          <p:cTn id="4" fill="hold">
+                            <p:stCondLst>
+                              <p:cond delay="0"/>
+                            </p:stCondLst>
+                            <p:childTnLst>
+                              <p:par>
+                                <p:cTn id="5" presetClass="entr" nodeType="clickEffect" presetSubtype="0" presetID="1" grpId="1" fill="hold">
+                                  <p:stCondLst>
+                                    <p:cond delay="0"/>
+                                  </p:stCondLst>
+                                  <p:iterate type="el" backwards="0">
+                                    <p:tmAbs val="0"/>
+                                  </p:iterate>
+                                  <p:childTnLst>
+                                    <p:set>
+                                      <p:cBhvr>
+                                        <p:cTn id="6" fill="hold"/>
+                                        <p:tgtEl>
+                                          <p:spTgt spid="132"/>
+                                        </p:tgtEl>
+                                        <p:attrNameLst>
+                                          <p:attrName>style.visibility</p:attrName>
+                                        </p:attrNameLst>
+                                      </p:cBhvr>
+                                      <p:to>
+                                        <p:strVal val="visible"/>
+                                      </p:to>
+                                    </p:set>
+                                  </p:childTnLst>
+                                </p:cTn>
+                              </p:par>
+                            </p:childTnLst>
+                          </p:cTn>
+                        </p:par>
+                      </p:childTnLst>
+                    </p:cTn>
+                  </p:par>
+                  <p:par>
+                    <p:cTn id="7" fill="hold">
+                      <p:stCondLst>
+                        <p:cond delay="indefinite"/>
+                      </p:stCondLst>
+                      <p:childTnLst>
+                        <p:par>
+                          <p:cTn id="8" fill="hold">
+                            <p:stCondLst>
+                              <p:cond delay="0"/>
+                            </p:stCondLst>
+                            <p:childTnLst>
+                              <p:par>
+                                <p:cTn id="9" presetClass="entr" nodeType="clickEffect" presetSubtype="0" presetID="1" grpId="2" fill="hold">
+                                  <p:stCondLst>
+                                    <p:cond delay="0"/>
+                                  </p:stCondLst>
+                                  <p:iterate type="el" backwards="0">
+                                    <p:tmAbs val="0"/>
+                                  </p:iterate>
+                                  <p:childTnLst>
+                                    <p:set>
+                                      <p:cBhvr>
+                                        <p:cTn id="10" fill="hold"/>
+                                        <p:tgtEl>
+                                          <p:spTgt spid="133"/>
+                                        </p:tgtEl>
+                                        <p:attrNameLst>
+                                          <p:attrName>style.visibility</p:attrName>
+                                        </p:attrNameLst>
+                                      </p:cBhvr>
+                                      <p:to>
+                                        <p:strVal val="visible"/>
+                                      </p:to>
+                                    </p:set>
+                                  </p:childTnLst>
+                                </p:cTn>
+                              </p:par>
+                            </p:childTnLst>
+                          </p:cTn>
+                        </p:par>
+                      </p:childTnLst>
+                    </p:cTn>
+                  </p:par>
+                </p:childTnLst>
+              </p:cTn>
+              <p:prevCondLst>
+                <p:cond evt="onPrev">
+                  <p:tgtEl>
+                    <p:sldTgt/>
+                  </p:tgtEl>
+                </p:cond>
+              </p:prevCondLst>
+              <p:nextCondLst>
+                <p:cond evt="onNext">
+                  <p:tgtEl>
+                    <p:sldTgt/>
+                  </p:tgtEl>
+                </p:cond>
+              </p:nextCondLst>
+            </p:seq>
+          </p:childTnLst>
+        </p:cTn>
+      </p:par>
+    </p:tnLst>
+    <p:bldLst>
+      <p:bldP build="whole" bldLvl="1" animBg="1" rev="0" advAuto="0" spid="133" grpId="2"/>
+      <p:bldP build="whole" bldLvl="1" animBg="1" rev="0" advAuto="0" spid="132" grpId="1"/>
+    </p:bldLst>
+  </p:timing>
+</p:sld>
+</file>
+
+<file path=ppt/slides/slide6.xml><?xml version="1.0" encoding="utf-8"?>
+<p:sld xmlns:a="http://schemas.openxmlformats.org/drawingml/2006/main" xmlns:r="http://schemas.openxmlformats.org/officeDocument/2006/relationships" xmlns:p="http://schemas.openxmlformats.org/presentationml/2006/main" showMasterSp="1" showMasterPhAnim="1">
+  <p:cSld>
+    <p:spTree>
+      <p:nvGrpSpPr>
+        <p:cNvPr id="1" name=""/>
+        <p:cNvGrpSpPr/>
+        <p:nvPr/>
+      </p:nvGrpSpPr>
+      <p:grpSpPr>
+        <a:xfrm>
+          <a:off x="0" y="0"/>
+          <a:ext cx="0" cy="0"/>
+          <a:chOff x="0" y="0"/>
+          <a:chExt cx="0" cy="0"/>
+        </a:xfrm>
+      </p:grpSpPr>
+      <p:sp>
+        <p:nvSpPr>
+          <p:cNvPr id="135" name="Shape 135"/>
+          <p:cNvSpPr/>
+          <p:nvPr>
+            <p:ph type="title"/>
+          </p:nvPr>
+        </p:nvSpPr>
+        <p:spPr>
+          <a:prstGeom prst="rect">
+            <a:avLst/>
+          </a:prstGeom>
+        </p:spPr>
+        <p:txBody>
+          <a:bodyPr/>
+          <a:lstStyle/>
+          <a:p>
+            <a:pPr/>
+            <a:r>
+              <a:t>Weather Eye</a:t>
+            </a:r>
+          </a:p>
+        </p:txBody>
+      </p:sp>
+      <p:sp>
+        <p:nvSpPr>
+          <p:cNvPr id="136" name="Shape 136"/>
+          <p:cNvSpPr/>
+          <p:nvPr>
+            <p:ph type="body" idx="1"/>
+          </p:nvPr>
+        </p:nvSpPr>
+        <p:spPr>
+          <a:prstGeom prst="rect">
+            <a:avLst/>
+          </a:prstGeom>
+        </p:spPr>
+        <p:txBody>
+          <a:bodyPr/>
+          <a:lstStyle/>
+          <a:p>
+            <a:pPr>
+              <a:defRPr sz="6400"/>
+            </a:pPr>
+            <a:r>
+              <a:t>Tracks the vehicle location, speed and heading</a:t>
+            </a:r>
+          </a:p>
+          <a:p>
+            <a:pPr>
+              <a:defRPr sz="6400"/>
+            </a:pPr>
+            <a:r>
+              <a:t>Predicts where you’ll be in 10 miles</a:t>
+            </a:r>
+          </a:p>
+          <a:p>
+            <a:pPr>
+              <a:defRPr sz="6400"/>
+            </a:pPr>
+            <a:r>
+              <a:t>Gets current weather at that location</a:t>
+            </a:r>
+          </a:p>
+          <a:p>
+            <a:pPr>
+              <a:defRPr sz="6400"/>
+            </a:pPr>
+            <a:r>
+              <a:t>Tells you to roll the windows up…</a:t>
+            </a:r>
+          </a:p>
+        </p:txBody>
+      </p:sp>
+    </p:spTree>
+  </p:cSld>
+  <p:clrMapOvr>
+    <a:masterClrMapping/>
+  </p:clrMapOvr>
+  <p:transition xmlns:p14="http://schemas.microsoft.com/office/powerpoint/2010/main" spd="med" advClick="1"/>
+  <p:timing>
+    <p:tnLst>
+      <p:par>
+        <p:cTn id="1" nodeType="tmRoot" restart="never" dur="indefinite" fill="hold">
+          <p:childTnLst>
+            <p:seq concurrent="1" prevAc="none" nextAc="seek">
+              <p:cTn id="2" nodeType="mainSeq" dur="indefinite" fill="hold">
+                <p:childTnLst>
+                  <p:par>
+                    <p:cTn id="3" fill="hold">
+                      <p:stCondLst>
+                        <p:cond delay="indefinite"/>
+                      </p:stCondLst>
+                      <p:childTnLst>
+                        <p:par>
+                          <p:cTn id="4" fill="hold">
+                            <p:stCondLst>
+                              <p:cond delay="0"/>
+                            </p:stCondLst>
+                            <p:childTnLst>
+                              <p:par>
+                                <p:cTn id="5" presetClass="entr" nodeType="clickEffect" presetSubtype="0" presetID="1" grpId="1" fill="hold">
+                                  <p:stCondLst>
+                                    <p:cond delay="0"/>
+                                  </p:stCondLst>
+                                  <p:iterate type="el" backwards="0">
+                                    <p:tmAbs val="0"/>
+                                  </p:iterate>
+                                  <p:childTnLst>
+                                    <p:set>
+                                      <p:cBhvr>
+                                        <p:cTn id="6" fill="hold"/>
+                                        <p:tgtEl>
+                                          <p:spTgt spid="136">
+                                            <p:bg/>
+                                          </p:spTgt>
+                                        </p:tgtEl>
+                                        <p:attrNameLst>
+                                          <p:attrName>style.visibility</p:attrName>
+                                        </p:attrNameLst>
+                                      </p:cBhvr>
+                                      <p:to>
+                                        <p:strVal val="visible"/>
+                                      </p:to>
+                                    </p:set>
+                                  </p:childTnLst>
+                                </p:cTn>
+                              </p:par>
+                              <p:par>
+                                <p:cTn id="7" presetClass="entr" nodeType="withEffect" presetSubtype="0" presetID="1" grpId="1" fill="hold">
+                                  <p:stCondLst>
+                                    <p:cond delay="0"/>
+                                  </p:stCondLst>
+                                  <p:iterate type="el" backwards="0">
+                                    <p:tmAbs val="0"/>
+                                  </p:iterate>
+                                  <p:childTnLst>
+                                    <p:set>
+                                      <p:cBhvr>
+                                        <p:cTn id="8" fill="hold"/>
+                                        <p:tgtEl>
+                                          <p:spTgt spid="136">
+                                            <p:txEl>
+                                              <p:pRg st="0" end="0"/>
+                                            </p:txEl>
+                                          </p:spTgt>
+                                        </p:tgtEl>
+                                        <p:attrNameLst>
+                                          <p:attrName>style.visibility</p:attrName>
+                                        </p:attrNameLst>
+                                      </p:cBhvr>
+                                      <p:to>
+                                        <p:strVal val="visible"/>
+                                      </p:to>
+                                    </p:set>
+                                  </p:childTnLst>
+                                </p:cTn>
+                              </p:par>
+                            </p:childTnLst>
+                          </p:cTn>
+                        </p:par>
+                      </p:childTnLst>
+                    </p:cTn>
+                  </p:par>
+                  <p:par>
+                    <p:cTn id="9" fill="hold">
+                      <p:stCondLst>
+                        <p:cond delay="indefinite"/>
+                      </p:stCondLst>
+                      <p:childTnLst>
+                        <p:par>
+                          <p:cTn id="10" fill="hold">
+                            <p:stCondLst>
+                              <p:cond delay="0"/>
+                            </p:stCondLst>
+                            <p:childTnLst>
+                              <p:par>
+                                <p:cTn id="11" presetClass="entr" nodeType="clickEffect" presetSubtype="0" presetID="1" grpId="1" fill="hold">
+                                  <p:stCondLst>
+                                    <p:cond delay="0"/>
+                                  </p:stCondLst>
+                                  <p:iterate type="el" backwards="0">
+                                    <p:tmAbs val="0"/>
+                                  </p:iterate>
+                                  <p:childTnLst>
+                                    <p:set>
+                                      <p:cBhvr>
+                                        <p:cTn id="12" fill="hold"/>
+                                        <p:tgtEl>
+                                          <p:spTgt spid="136">
+                                            <p:txEl>
+                                              <p:pRg st="1" end="1"/>
+                                            </p:txEl>
+                                          </p:spTgt>
+                                        </p:tgtEl>
+                                        <p:attrNameLst>
+                                          <p:attrName>style.visibility</p:attrName>
+                                        </p:attrNameLst>
+                                      </p:cBhvr>
+                                      <p:to>
+                                        <p:strVal val="visible"/>
+                                      </p:to>
+                                    </p:set>
+                                  </p:childTnLst>
+                                </p:cTn>
+                              </p:par>
+                            </p:childTnLst>
+                          </p:cTn>
+                        </p:par>
+                      </p:childTnLst>
+                    </p:cTn>
+                  </p:par>
+                  <p:par>
+                    <p:cTn id="13" fill="hold">
+                      <p:stCondLst>
+                        <p:cond delay="indefinite"/>
+                      </p:stCondLst>
+                      <p:childTnLst>
+                        <p:par>
+                          <p:cTn id="14" fill="hold">
+                            <p:stCondLst>
+                              <p:cond delay="0"/>
+                            </p:stCondLst>
+                            <p:childTnLst>
+                              <p:par>
+                                <p:cTn id="15" presetClass="entr" nodeType="clickEffect" presetSubtype="0" presetID="1" grpId="1" fill="hold">
+                                  <p:stCondLst>
+                                    <p:cond delay="0"/>
+                                  </p:stCondLst>
+                                  <p:iterate type="el" backwards="0">
+                                    <p:tmAbs val="0"/>
+                                  </p:iterate>
+                                  <p:childTnLst>
+                                    <p:set>
+                                      <p:cBhvr>
+                                        <p:cTn id="16" fill="hold"/>
+                                        <p:tgtEl>
+                                          <p:spTgt spid="136">
                                             <p:txEl>
                                               <p:pRg st="2" end="2"/>
                                             </p:txEl>
@@ -4274,7 +4616,7 @@
                                       <p:cBhvr>
                                         <p:cTn id="20" fill="hold"/>
                                         <p:tgtEl>
-                                          <p:spTgt spid="133">
+                                          <p:spTgt spid="136">
                                             <p:txEl>
                                               <p:pRg st="3" end="3"/>
                                             </p:txEl>
@@ -4319,59 +4661,9 @@
       </p:par>
     </p:tnLst>
     <p:bldLst>
-      <p:bldP build="p" bldLvl="5" animBg="1" rev="0" advAuto="0" spid="133" grpId="1"/>
+      <p:bldP build="p" bldLvl="5" animBg="1" rev="0" advAuto="0" spid="136" grpId="1"/>
     </p:bldLst>
   </p:timing>
-</p:sld>
-</file>
-
-<file path=ppt/slides/slide6.xml><?xml version="1.0" encoding="utf-8"?>
-<p:sld xmlns:a="http://schemas.openxmlformats.org/drawingml/2006/main" xmlns:r="http://schemas.openxmlformats.org/officeDocument/2006/relationships" xmlns:p="http://schemas.openxmlformats.org/presentationml/2006/main" showMasterSp="1" showMasterPhAnim="1">
-  <p:cSld>
-    <p:spTree>
-      <p:nvGrpSpPr>
-        <p:cNvPr id="1" name=""/>
-        <p:cNvGrpSpPr/>
-        <p:nvPr/>
-      </p:nvGrpSpPr>
-      <p:grpSpPr>
-        <a:xfrm>
-          <a:off x="0" y="0"/>
-          <a:ext cx="0" cy="0"/>
-          <a:chOff x="0" y="0"/>
-          <a:chExt cx="0" cy="0"/>
-        </a:xfrm>
-      </p:grpSpPr>
-      <p:sp>
-        <p:nvSpPr>
-          <p:cNvPr id="135" name="Shape 135"/>
-          <p:cNvSpPr/>
-          <p:nvPr>
-            <p:ph type="title"/>
-          </p:nvPr>
-        </p:nvSpPr>
-        <p:spPr>
-          <a:prstGeom prst="rect">
-            <a:avLst/>
-          </a:prstGeom>
-        </p:spPr>
-        <p:txBody>
-          <a:bodyPr/>
-          <a:lstStyle/>
-          <a:p>
-            <a:pPr/>
-            <a:r>
-              <a:t>Demo</a:t>
-            </a:r>
-          </a:p>
-        </p:txBody>
-      </p:sp>
-    </p:spTree>
-  </p:cSld>
-  <p:clrMapOvr>
-    <a:masterClrMapping/>
-  </p:clrMapOvr>
-  <p:transition xmlns:p14="http://schemas.microsoft.com/office/powerpoint/2010/main" spd="med" advClick="1"/>
 </p:sld>
 </file>
 
@@ -4394,7 +4686,7 @@
       </p:grpSpPr>
       <p:sp>
         <p:nvSpPr>
-          <p:cNvPr id="137" name="Shape 137"/>
+          <p:cNvPr id="138" name="Shape 138"/>
           <p:cNvSpPr/>
           <p:nvPr>
             <p:ph type="title"/>
@@ -4411,6 +4703,56 @@
           <a:p>
             <a:pPr/>
             <a:r>
+              <a:t>Demo</a:t>
+            </a:r>
+          </a:p>
+        </p:txBody>
+      </p:sp>
+    </p:spTree>
+  </p:cSld>
+  <p:clrMapOvr>
+    <a:masterClrMapping/>
+  </p:clrMapOvr>
+  <p:transition xmlns:p14="http://schemas.microsoft.com/office/powerpoint/2010/main" spd="med" advClick="1"/>
+</p:sld>
+</file>
+
+<file path=ppt/slides/slide8.xml><?xml version="1.0" encoding="utf-8"?>
+<p:sld xmlns:a="http://schemas.openxmlformats.org/drawingml/2006/main" xmlns:r="http://schemas.openxmlformats.org/officeDocument/2006/relationships" xmlns:p="http://schemas.openxmlformats.org/presentationml/2006/main" showMasterSp="1" showMasterPhAnim="1">
+  <p:cSld>
+    <p:spTree>
+      <p:nvGrpSpPr>
+        <p:cNvPr id="1" name=""/>
+        <p:cNvGrpSpPr/>
+        <p:nvPr/>
+      </p:nvGrpSpPr>
+      <p:grpSpPr>
+        <a:xfrm>
+          <a:off x="0" y="0"/>
+          <a:ext cx="0" cy="0"/>
+          <a:chOff x="0" y="0"/>
+          <a:chExt cx="0" cy="0"/>
+        </a:xfrm>
+      </p:grpSpPr>
+      <p:sp>
+        <p:nvSpPr>
+          <p:cNvPr id="140" name="Shape 140"/>
+          <p:cNvSpPr/>
+          <p:nvPr>
+            <p:ph type="title"/>
+          </p:nvPr>
+        </p:nvSpPr>
+        <p:spPr>
+          <a:prstGeom prst="rect">
+            <a:avLst/>
+          </a:prstGeom>
+        </p:spPr>
+        <p:txBody>
+          <a:bodyPr/>
+          <a:lstStyle/>
+          <a:p>
+            <a:pPr/>
+            <a:r>
               <a:t>Other Uses…</a:t>
             </a:r>
           </a:p>
@@ -4418,7 +4760,7 @@
       </p:sp>
       <p:sp>
         <p:nvSpPr>
-          <p:cNvPr id="138" name="Shape 138"/>
+          <p:cNvPr id="141" name="Shape 141"/>
           <p:cNvSpPr/>
           <p:nvPr>
             <p:ph type="body" idx="1"/>
@@ -4505,7 +4847,7 @@
                                       <p:cBhvr>
                                         <p:cTn id="6" fill="hold"/>
                                         <p:tgtEl>
-                                          <p:spTgt spid="138">
+                                          <p:spTgt spid="141">
                                             <p:bg/>
                                           </p:spTgt>
                                         </p:tgtEl>
@@ -4533,7 +4875,7 @@
                                       <p:cBhvr>
                                         <p:cTn id="8" fill="hold"/>
                                         <p:tgtEl>
-                                          <p:spTgt spid="138">
+                                          <p:spTgt spid="141">
                                             <p:txEl>
                                               <p:pRg st="0" end="0"/>
                                             </p:txEl>
@@ -4581,7 +4923,7 @@
                                       <p:cBhvr>
                                         <p:cTn id="12" fill="hold"/>
                                         <p:tgtEl>
-                                          <p:spTgt spid="138">
+                                          <p:spTgt spid="141">
                                             <p:txEl>
                                               <p:pRg st="1" end="1"/>
                                             </p:txEl>
@@ -4629,7 +4971,7 @@
                                       <p:cBhvr>
                                         <p:cTn id="16" fill="hold"/>
                                         <p:tgtEl>
-                                          <p:spTgt spid="138">
+                                          <p:spTgt spid="141">
                                             <p:txEl>
                                               <p:pRg st="2" end="2"/>
                                             </p:txEl>
@@ -4677,7 +5019,7 @@
                                       <p:cBhvr>
                                         <p:cTn id="20" fill="hold"/>
                                         <p:tgtEl>
-                                          <p:spTgt spid="138">
+                                          <p:spTgt spid="141">
                                             <p:txEl>
                                               <p:pRg st="3" end="3"/>
                                             </p:txEl>
@@ -4722,7 +5064,7 @@
       </p:par>
     </p:tnLst>
     <p:bldLst>
-      <p:bldP build="p" bldLvl="5" animBg="1" rev="0" advAuto="0" spid="138" grpId="1"/>
+      <p:bldP build="p" bldLvl="5" animBg="1" rev="0" advAuto="0" spid="141" grpId="1"/>
     </p:bldLst>
   </p:timing>
 </p:sld>

</xml_diff>

<commit_message>
updated presentations with correct team name
</commit_message>
<xml_diff>
--- a/weatherEye.pptx
+++ b/weatherEye.pptx
@@ -3067,7 +3067,7 @@
               </a:defRPr>
             </a:pPr>
             <a:r>
-              <a:t>Team “Your Name Goes Here”</a:t>
+              <a:t>Team “WeatherWatch”</a:t>
             </a:r>
           </a:p>
           <a:p>
@@ -4341,8 +4341,8 @@
       </p:par>
     </p:tnLst>
     <p:bldLst>
+      <p:bldP build="whole" bldLvl="1" animBg="1" rev="0" advAuto="0" spid="133" grpId="1"/>
       <p:bldP build="whole" bldLvl="1" animBg="1" rev="0" advAuto="0" spid="134" grpId="2"/>
-      <p:bldP build="whole" bldLvl="1" animBg="1" rev="0" advAuto="0" spid="133" grpId="1"/>
     </p:bldLst>
   </p:timing>
 </p:sld>

</xml_diff>